<commit_message>
Fixing capitalization on last slide
</commit_message>
<xml_diff>
--- a/RHD Boston AI Meetup  082917.pptx
+++ b/RHD Boston AI Meetup  082917.pptx
@@ -209,7 +209,7 @@
           <a:p>
             <a:fld id="{B62F05D7-3FD0-1245-A539-40B885552057}" type="datetimeFigureOut">
               <a:rPr lang="en-US" smtClean="0"/>
-              <a:t>8/26/17</a:t>
+              <a:t>8/28/17</a:t>
             </a:fld>
             <a:endParaRPr lang="en-US"/>
           </a:p>
@@ -692,7 +692,7 @@
           <a:p>
             <a:fld id="{687C075B-D41C-B349-A5E4-3D047E04C14E}" type="datetimeFigureOut">
               <a:rPr lang="en-US" smtClean="0"/>
-              <a:t>8/26/17</a:t>
+              <a:t>8/28/17</a:t>
             </a:fld>
             <a:endParaRPr lang="en-US"/>
           </a:p>
@@ -862,7 +862,7 @@
           <a:p>
             <a:fld id="{687C075B-D41C-B349-A5E4-3D047E04C14E}" type="datetimeFigureOut">
               <a:rPr lang="en-US" smtClean="0"/>
-              <a:t>8/26/17</a:t>
+              <a:t>8/28/17</a:t>
             </a:fld>
             <a:endParaRPr lang="en-US"/>
           </a:p>
@@ -1042,7 +1042,7 @@
           <a:p>
             <a:fld id="{687C075B-D41C-B349-A5E4-3D047E04C14E}" type="datetimeFigureOut">
               <a:rPr lang="en-US" smtClean="0"/>
-              <a:t>8/26/17</a:t>
+              <a:t>8/28/17</a:t>
             </a:fld>
             <a:endParaRPr lang="en-US"/>
           </a:p>
@@ -1212,7 +1212,7 @@
           <a:p>
             <a:fld id="{687C075B-D41C-B349-A5E4-3D047E04C14E}" type="datetimeFigureOut">
               <a:rPr lang="en-US" smtClean="0"/>
-              <a:t>8/26/17</a:t>
+              <a:t>8/28/17</a:t>
             </a:fld>
             <a:endParaRPr lang="en-US"/>
           </a:p>
@@ -1458,7 +1458,7 @@
           <a:p>
             <a:fld id="{687C075B-D41C-B349-A5E4-3D047E04C14E}" type="datetimeFigureOut">
               <a:rPr lang="en-US" smtClean="0"/>
-              <a:t>8/26/17</a:t>
+              <a:t>8/28/17</a:t>
             </a:fld>
             <a:endParaRPr lang="en-US"/>
           </a:p>
@@ -1690,7 +1690,7 @@
           <a:p>
             <a:fld id="{687C075B-D41C-B349-A5E4-3D047E04C14E}" type="datetimeFigureOut">
               <a:rPr lang="en-US" smtClean="0"/>
-              <a:t>8/26/17</a:t>
+              <a:t>8/28/17</a:t>
             </a:fld>
             <a:endParaRPr lang="en-US"/>
           </a:p>
@@ -2057,7 +2057,7 @@
           <a:p>
             <a:fld id="{687C075B-D41C-B349-A5E4-3D047E04C14E}" type="datetimeFigureOut">
               <a:rPr lang="en-US" smtClean="0"/>
-              <a:t>8/26/17</a:t>
+              <a:t>8/28/17</a:t>
             </a:fld>
             <a:endParaRPr lang="en-US"/>
           </a:p>
@@ -2175,7 +2175,7 @@
           <a:p>
             <a:fld id="{687C075B-D41C-B349-A5E4-3D047E04C14E}" type="datetimeFigureOut">
               <a:rPr lang="en-US" smtClean="0"/>
-              <a:t>8/26/17</a:t>
+              <a:t>8/28/17</a:t>
             </a:fld>
             <a:endParaRPr lang="en-US"/>
           </a:p>
@@ -2270,7 +2270,7 @@
           <a:p>
             <a:fld id="{687C075B-D41C-B349-A5E4-3D047E04C14E}" type="datetimeFigureOut">
               <a:rPr lang="en-US" smtClean="0"/>
-              <a:t>8/26/17</a:t>
+              <a:t>8/28/17</a:t>
             </a:fld>
             <a:endParaRPr lang="en-US"/>
           </a:p>
@@ -2547,7 +2547,7 @@
           <a:p>
             <a:fld id="{687C075B-D41C-B349-A5E4-3D047E04C14E}" type="datetimeFigureOut">
               <a:rPr lang="en-US" smtClean="0"/>
-              <a:t>8/26/17</a:t>
+              <a:t>8/28/17</a:t>
             </a:fld>
             <a:endParaRPr lang="en-US"/>
           </a:p>
@@ -2800,7 +2800,7 @@
           <a:p>
             <a:fld id="{687C075B-D41C-B349-A5E4-3D047E04C14E}" type="datetimeFigureOut">
               <a:rPr lang="en-US" smtClean="0"/>
-              <a:t>8/26/17</a:t>
+              <a:t>8/28/17</a:t>
             </a:fld>
             <a:endParaRPr lang="en-US"/>
           </a:p>
@@ -3013,7 +3013,7 @@
           <a:p>
             <a:fld id="{687C075B-D41C-B349-A5E4-3D047E04C14E}" type="datetimeFigureOut">
               <a:rPr lang="en-US" smtClean="0"/>
-              <a:t>8/26/17</a:t>
+              <a:t>8/28/17</a:t>
             </a:fld>
             <a:endParaRPr lang="en-US"/>
           </a:p>
@@ -4193,18 +4193,26 @@
           <a:lstStyle/>
           <a:p>
             <a:r>
-              <a:rPr lang="en-US" smtClean="0"/>
-              <a:t>Thank you</a:t>
+              <a:rPr lang="en-US" dirty="0" smtClean="0"/>
+              <a:t>Thank </a:t>
+            </a:r>
+            <a:r>
+              <a:rPr lang="en-US" dirty="0" smtClean="0"/>
+              <a:t>You</a:t>
+            </a:r>
+            <a:r>
+              <a:rPr lang="en-US" dirty="0" smtClean="0"/>
+              <a:t/>
             </a:r>
             <a:br>
-              <a:rPr lang="en-US" smtClean="0"/>
+              <a:rPr lang="en-US" dirty="0" smtClean="0"/>
             </a:br>
             <a:r>
-              <a:rPr lang="en-US"/>
+              <a:rPr lang="en-US" dirty="0"/>
               <a:t/>
             </a:r>
             <a:br>
-              <a:rPr lang="en-US"/>
+              <a:rPr lang="en-US" dirty="0"/>
             </a:br>
             <a:r>
               <a:rPr lang="en-US" dirty="0" err="1" smtClean="0"/>
@@ -4962,11 +4970,7 @@
             </a:pPr>
             <a:r>
               <a:rPr lang="en-US" sz="4400" dirty="0" smtClean="0"/>
-              <a:t>Made </a:t>
-            </a:r>
-            <a:r>
-              <a:rPr lang="en-US" sz="4400" dirty="0" smtClean="0"/>
-              <a:t>by NCSA ~1997</a:t>
+              <a:t>Made by NCSA ~1997</a:t>
             </a:r>
           </a:p>
           <a:p>
@@ -5265,7 +5269,7 @@
         </p:spPr>
         <p:txBody>
           <a:bodyPr vert="horz">
-            <a:normAutofit fontScale="85000" lnSpcReduction="20000"/>
+            <a:normAutofit fontScale="77500" lnSpcReduction="20000"/>
           </a:bodyPr>
           <a:lstStyle/>
           <a:p>
@@ -5296,98 +5300,116 @@
               <a:buNone/>
             </a:pPr>
             <a:r>
-              <a:rPr lang="en-US" sz="4400" dirty="0" smtClean="0"/>
+              <a:rPr lang="en-US" sz="4700" dirty="0" smtClean="0"/>
               <a:t>BVLC/</a:t>
             </a:r>
             <a:r>
-              <a:rPr lang="en-US" sz="4400" dirty="0" err="1" smtClean="0"/>
+              <a:rPr lang="en-US" sz="4700" dirty="0" err="1" smtClean="0"/>
               <a:t>caffe</a:t>
             </a:r>
             <a:r>
-              <a:rPr lang="en-US" sz="4400" dirty="0" smtClean="0"/>
+              <a:rPr lang="en-US" sz="4700" dirty="0" smtClean="0"/>
               <a:t>/blob/master/</a:t>
             </a:r>
             <a:r>
-              <a:rPr lang="en-US" sz="4400" dirty="0" err="1" smtClean="0"/>
+              <a:rPr lang="en-US" sz="4700" dirty="0" err="1" smtClean="0"/>
               <a:t>src</a:t>
             </a:r>
             <a:r>
-              <a:rPr lang="en-US" sz="4400" dirty="0" smtClean="0"/>
+              <a:rPr lang="en-US" sz="4700" dirty="0" smtClean="0"/>
               <a:t>/</a:t>
             </a:r>
             <a:r>
-              <a:rPr lang="en-US" sz="4400" dirty="0" err="1" smtClean="0"/>
+              <a:rPr lang="en-US" sz="4700" dirty="0" err="1" smtClean="0"/>
               <a:t>caffe</a:t>
             </a:r>
             <a:r>
-              <a:rPr lang="en-US" sz="4400" dirty="0" smtClean="0"/>
+              <a:rPr lang="en-US" sz="4700" dirty="0" smtClean="0"/>
               <a:t>/proto/</a:t>
             </a:r>
             <a:r>
-              <a:rPr lang="en-US" sz="4400" dirty="0" err="1" smtClean="0"/>
+              <a:rPr lang="en-US" sz="4700" dirty="0" err="1" smtClean="0"/>
               <a:t>caffe.proto</a:t>
             </a:r>
-            <a:endParaRPr lang="en-US" sz="4400" dirty="0" smtClean="0"/>
+            <a:endParaRPr lang="en-US" sz="4700" dirty="0" smtClean="0"/>
           </a:p>
           <a:p>
             <a:pPr marL="0" indent="0">
               <a:buNone/>
             </a:pPr>
-            <a:endParaRPr lang="en-US" sz="4400" dirty="0"/>
+            <a:endParaRPr lang="en-US" sz="4700" dirty="0"/>
           </a:p>
           <a:p>
             <a:pPr marL="0" indent="0">
               <a:buNone/>
             </a:pPr>
             <a:r>
-              <a:rPr lang="en-US" sz="4400" dirty="0" smtClean="0"/>
-              <a:t>Microsoft/CNTK/blob/master/Source/CNTKv2LibraryDll/proto/</a:t>
-            </a:r>
-            <a:r>
-              <a:rPr lang="en-US" sz="4400" dirty="0" err="1" smtClean="0"/>
+              <a:rPr lang="en-US" sz="4700" dirty="0" smtClean="0"/>
+              <a:t>Microsoft/CNTK/blob/master/Source</a:t>
+            </a:r>
+            <a:r>
+              <a:rPr lang="en-US" sz="4700" dirty="0" smtClean="0"/>
+              <a:t>/</a:t>
+            </a:r>
+            <a:br>
+              <a:rPr lang="en-US" sz="4700" dirty="0" smtClean="0"/>
+            </a:br>
+            <a:r>
+              <a:rPr lang="en-US" sz="4700" dirty="0" smtClean="0"/>
+              <a:t>CNTKv2LibraryDll/proto/</a:t>
+            </a:r>
+            <a:r>
+              <a:rPr lang="en-US" sz="4700" dirty="0" err="1" smtClean="0"/>
               <a:t>CNTK.proto</a:t>
             </a:r>
-            <a:endParaRPr lang="en-US" sz="4400" dirty="0" smtClean="0"/>
+            <a:endParaRPr lang="en-US" sz="4700" dirty="0" smtClean="0"/>
           </a:p>
           <a:p>
             <a:pPr marL="0" indent="0">
               <a:buNone/>
             </a:pPr>
-            <a:endParaRPr lang="en-US" sz="4400" dirty="0"/>
+            <a:endParaRPr lang="en-US" sz="4700" dirty="0"/>
           </a:p>
           <a:p>
             <a:pPr marL="0" indent="0">
               <a:buNone/>
             </a:pPr>
             <a:r>
-              <a:rPr lang="en-US" sz="4400" dirty="0" err="1" smtClean="0"/>
+              <a:rPr lang="en-US" sz="4700" dirty="0" err="1" smtClean="0"/>
               <a:t>tensorflow</a:t>
             </a:r>
             <a:r>
-              <a:rPr lang="en-US" sz="4400" dirty="0" smtClean="0"/>
+              <a:rPr lang="en-US" sz="4700" dirty="0" smtClean="0"/>
               <a:t>/</a:t>
             </a:r>
             <a:r>
-              <a:rPr lang="en-US" sz="4400" dirty="0" err="1" smtClean="0"/>
+              <a:rPr lang="en-US" sz="4700" dirty="0" err="1" smtClean="0"/>
               <a:t>tensorflow</a:t>
             </a:r>
             <a:r>
-              <a:rPr lang="en-US" sz="4400" dirty="0" smtClean="0"/>
-              <a:t>/blob/master/</a:t>
-            </a:r>
-            <a:r>
-              <a:rPr lang="en-US" sz="4400" dirty="0" err="1" smtClean="0"/>
+              <a:rPr lang="en-US" sz="4700" dirty="0" smtClean="0"/>
+              <a:t>/blob/master</a:t>
+            </a:r>
+            <a:r>
+              <a:rPr lang="en-US" sz="4700" dirty="0" smtClean="0"/>
+              <a:t>/</a:t>
+            </a:r>
+            <a:br>
+              <a:rPr lang="en-US" sz="4700" dirty="0" smtClean="0"/>
+            </a:br>
+            <a:r>
+              <a:rPr lang="en-US" sz="4700" dirty="0" err="1" smtClean="0"/>
               <a:t>tensorflow</a:t>
             </a:r>
             <a:r>
-              <a:rPr lang="en-US" sz="4400" dirty="0" smtClean="0"/>
+              <a:rPr lang="en-US" sz="4700" dirty="0" smtClean="0"/>
               <a:t>/core/framework/</a:t>
             </a:r>
             <a:r>
-              <a:rPr lang="en-US" sz="4400" dirty="0" err="1" smtClean="0"/>
+              <a:rPr lang="en-US" sz="4700" dirty="0" err="1" smtClean="0"/>
               <a:t>graph.proto</a:t>
             </a:r>
-            <a:endParaRPr lang="en-US" sz="4400" dirty="0"/>
+            <a:endParaRPr lang="en-US" sz="4700" dirty="0"/>
           </a:p>
         </p:txBody>
       </p:sp>
@@ -5530,11 +5552,7 @@
             </a:r>
             <a:r>
               <a:rPr lang="en-US" sz="4400" dirty="0" smtClean="0"/>
-              <a:t>-us/cognitive-toolkit/features/model-gallery</a:t>
-            </a:r>
-            <a:r>
-              <a:rPr lang="en-US" sz="4400" dirty="0" smtClean="0"/>
-              <a:t>/</a:t>
+              <a:t>-us/cognitive-toolkit/features/model-gallery/</a:t>
             </a:r>
           </a:p>
           <a:p>

</xml_diff>